<commit_message>
Newtonsoft.JSON -> Deserialized object
</commit_message>
<xml_diff>
--- a/Cours 9 - Storage, Settings and Web/09 - Storage, Settings and Web.pptx
+++ b/Cours 9 - Storage, Settings and Web/09 - Storage, Settings and Web.pptx
@@ -332,7 +332,7 @@
             <a:fld id="{36397F7C-9109-41AA-AF3F-C9CBB169BBFF}" type="datetime1">
               <a:rPr lang="en-US"/>
               <a:pPr/>
-              <a:t>3/2/16</a:t>
+              <a:t>4/11/16</a:t>
             </a:fld>
             <a:endParaRPr lang="en-US"/>
           </a:p>
@@ -578,7 +578,7 @@
             <a:fld id="{7EF0411E-54B7-49D7-BF23-01683CC1CD67}" type="datetime1">
               <a:rPr lang="en-US"/>
               <a:pPr/>
-              <a:t>3/2/16</a:t>
+              <a:t>4/11/16</a:t>
             </a:fld>
             <a:endParaRPr lang="en-US"/>
           </a:p>
@@ -1605,7 +1605,7 @@
             <a:fld id="{7EF0411E-54B7-49D7-BF23-01683CC1CD67}" type="datetime1">
               <a:rPr lang="en-US" smtClean="0"/>
               <a:pPr/>
-              <a:t>3/2/16</a:t>
+              <a:t>4/11/16</a:t>
             </a:fld>
             <a:endParaRPr lang="en-US"/>
           </a:p>
@@ -1763,7 +1763,7 @@
             <a:fld id="{7EF0411E-54B7-49D7-BF23-01683CC1CD67}" type="datetime1">
               <a:rPr lang="en-US" smtClean="0"/>
               <a:pPr/>
-              <a:t>3/2/16</a:t>
+              <a:t>4/11/16</a:t>
             </a:fld>
             <a:endParaRPr lang="en-US"/>
           </a:p>
@@ -1921,7 +1921,7 @@
             <a:fld id="{7EF0411E-54B7-49D7-BF23-01683CC1CD67}" type="datetime1">
               <a:rPr lang="en-US" smtClean="0"/>
               <a:pPr/>
-              <a:t>3/2/16</a:t>
+              <a:t>4/11/16</a:t>
             </a:fld>
             <a:endParaRPr lang="en-US"/>
           </a:p>
@@ -2006,7 +2006,7 @@
       </p:grpSpPr>
       <p:sp>
         <p:nvSpPr>
-          <p:cNvPr id="2" name="Espace réservé de l'image des diapositives 1"/>
+          <p:cNvPr id="2" name="Espace réservé de l’image des diapositives 1"/>
           <p:cNvSpPr>
             <a:spLocks noGrp="1" noRot="1" noChangeAspect="1"/>
           </p:cNvSpPr>
@@ -2031,29 +2031,13 @@
           <a:bodyPr/>
           <a:lstStyle/>
           <a:p>
-            <a:r>
-              <a:rPr lang="fr-FR" dirty="0" smtClean="0"/>
-              <a:t>Picture </a:t>
-            </a:r>
-            <a:r>
-              <a:rPr lang="fr-FR" dirty="0" err="1" smtClean="0"/>
-              <a:t>from</a:t>
-            </a:r>
-            <a:r>
-              <a:rPr lang="fr-FR" dirty="0" smtClean="0"/>
-              <a:t> </a:t>
-            </a:r>
-            <a:r>
-              <a:rPr lang="fr-FR" dirty="0" err="1" smtClean="0"/>
-              <a:t>asdfmovie</a:t>
-            </a:r>
-            <a:endParaRPr lang="en-US" dirty="0"/>
-          </a:p>
-        </p:txBody>
-      </p:sp>
-      <p:sp>
-        <p:nvSpPr>
-          <p:cNvPr id="4" name="Espace réservé de l'en-tête 3"/>
+            <a:endParaRPr lang="en-GB" dirty="0"/>
+          </a:p>
+        </p:txBody>
+      </p:sp>
+      <p:sp>
+        <p:nvSpPr>
+          <p:cNvPr id="4" name="Espace réservé de l’en-tête 3"/>
           <p:cNvSpPr>
             <a:spLocks noGrp="1"/>
           </p:cNvSpPr>
@@ -2095,7 +2079,7 @@
             <a:fld id="{7EF0411E-54B7-49D7-BF23-01683CC1CD67}" type="datetime1">
               <a:rPr lang="en-US" smtClean="0"/>
               <a:pPr/>
-              <a:t>3/2/16</a:t>
+              <a:t>4/11/16</a:t>
             </a:fld>
             <a:endParaRPr lang="en-US"/>
           </a:p>
@@ -2142,7 +2126,7 @@
             <a:fld id="{F2894214-72F6-4306-9C26-759FB68F50CD}" type="slidenum">
               <a:rPr lang="en-US" smtClean="0"/>
               <a:pPr/>
-              <a:t>25</a:t>
+              <a:t>23</a:t>
             </a:fld>
             <a:endParaRPr lang="en-US"/>
           </a:p>
@@ -2151,7 +2135,7 @@
     </p:spTree>
     <p:extLst>
       <p:ext uri="{BB962C8B-B14F-4D97-AF65-F5344CB8AC3E}">
-        <p14:creationId xmlns:p14="http://schemas.microsoft.com/office/powerpoint/2010/main" val="1645794177"/>
+        <p14:creationId xmlns:p14="http://schemas.microsoft.com/office/powerpoint/2010/main" val="1957839307"/>
       </p:ext>
     </p:extLst>
   </p:cSld>
@@ -2205,7 +2189,23 @@
           <a:bodyPr/>
           <a:lstStyle/>
           <a:p>
-            <a:endParaRPr lang="fr-FR" dirty="0"/>
+            <a:r>
+              <a:rPr lang="fr-FR" dirty="0" smtClean="0"/>
+              <a:t>Picture </a:t>
+            </a:r>
+            <a:r>
+              <a:rPr lang="fr-FR" dirty="0" err="1" smtClean="0"/>
+              <a:t>from</a:t>
+            </a:r>
+            <a:r>
+              <a:rPr lang="fr-FR" dirty="0" smtClean="0"/>
+              <a:t> </a:t>
+            </a:r>
+            <a:r>
+              <a:rPr lang="fr-FR" dirty="0" err="1" smtClean="0"/>
+              <a:t>asdfmovie</a:t>
+            </a:r>
+            <a:endParaRPr lang="en-US" dirty="0"/>
           </a:p>
         </p:txBody>
       </p:sp>
@@ -2253,7 +2253,7 @@
             <a:fld id="{7EF0411E-54B7-49D7-BF23-01683CC1CD67}" type="datetime1">
               <a:rPr lang="en-US" smtClean="0"/>
               <a:pPr/>
-              <a:t>3/2/16</a:t>
+              <a:t>4/11/16</a:t>
             </a:fld>
             <a:endParaRPr lang="en-US"/>
           </a:p>
@@ -2300,7 +2300,7 @@
             <a:fld id="{F2894214-72F6-4306-9C26-759FB68F50CD}" type="slidenum">
               <a:rPr lang="en-US" smtClean="0"/>
               <a:pPr/>
-              <a:t>26</a:t>
+              <a:t>25</a:t>
             </a:fld>
             <a:endParaRPr lang="en-US"/>
           </a:p>
@@ -2309,7 +2309,7 @@
     </p:spTree>
     <p:extLst>
       <p:ext uri="{BB962C8B-B14F-4D97-AF65-F5344CB8AC3E}">
-        <p14:creationId xmlns:p14="http://schemas.microsoft.com/office/powerpoint/2010/main" val="2637502241"/>
+        <p14:creationId xmlns:p14="http://schemas.microsoft.com/office/powerpoint/2010/main" val="1645794177"/>
       </p:ext>
     </p:extLst>
   </p:cSld>
@@ -2411,7 +2411,7 @@
             <a:fld id="{7EF0411E-54B7-49D7-BF23-01683CC1CD67}" type="datetime1">
               <a:rPr lang="en-US" smtClean="0"/>
               <a:pPr/>
-              <a:t>3/2/16</a:t>
+              <a:t>4/11/16</a:t>
             </a:fld>
             <a:endParaRPr lang="en-US"/>
           </a:p>
@@ -2458,7 +2458,7 @@
             <a:fld id="{F2894214-72F6-4306-9C26-759FB68F50CD}" type="slidenum">
               <a:rPr lang="en-US" smtClean="0"/>
               <a:pPr/>
-              <a:t>27</a:t>
+              <a:t>26</a:t>
             </a:fld>
             <a:endParaRPr lang="en-US"/>
           </a:p>
@@ -2467,7 +2467,7 @@
     </p:spTree>
     <p:extLst>
       <p:ext uri="{BB962C8B-B14F-4D97-AF65-F5344CB8AC3E}">
-        <p14:creationId xmlns:p14="http://schemas.microsoft.com/office/powerpoint/2010/main" val="3066722338"/>
+        <p14:creationId xmlns:p14="http://schemas.microsoft.com/office/powerpoint/2010/main" val="2637502241"/>
       </p:ext>
     </p:extLst>
   </p:cSld>
@@ -2569,7 +2569,7 @@
             <a:fld id="{7EF0411E-54B7-49D7-BF23-01683CC1CD67}" type="datetime1">
               <a:rPr lang="en-US" smtClean="0"/>
               <a:pPr/>
-              <a:t>3/2/16</a:t>
+              <a:t>4/11/16</a:t>
             </a:fld>
             <a:endParaRPr lang="en-US"/>
           </a:p>
@@ -2616,7 +2616,7 @@
             <a:fld id="{F2894214-72F6-4306-9C26-759FB68F50CD}" type="slidenum">
               <a:rPr lang="en-US" smtClean="0"/>
               <a:pPr/>
-              <a:t>28</a:t>
+              <a:t>27</a:t>
             </a:fld>
             <a:endParaRPr lang="en-US"/>
           </a:p>
@@ -2625,7 +2625,7 @@
     </p:spTree>
     <p:extLst>
       <p:ext uri="{BB962C8B-B14F-4D97-AF65-F5344CB8AC3E}">
-        <p14:creationId xmlns:p14="http://schemas.microsoft.com/office/powerpoint/2010/main" val="753893475"/>
+        <p14:creationId xmlns:p14="http://schemas.microsoft.com/office/powerpoint/2010/main" val="3066722338"/>
       </p:ext>
     </p:extLst>
   </p:cSld>
@@ -2679,189 +2679,6 @@
           <a:bodyPr/>
           <a:lstStyle/>
           <a:p>
-            <a:r>
-              <a:rPr lang="fr-FR" dirty="0" err="1" smtClean="0"/>
-              <a:t>We’ll</a:t>
-            </a:r>
-            <a:r>
-              <a:rPr lang="fr-FR" dirty="0" smtClean="0"/>
-              <a:t> </a:t>
-            </a:r>
-            <a:r>
-              <a:rPr lang="fr-FR" dirty="0" err="1" smtClean="0"/>
-              <a:t>see</a:t>
-            </a:r>
-            <a:r>
-              <a:rPr lang="fr-FR" dirty="0" smtClean="0"/>
-              <a:t> a</a:t>
-            </a:r>
-            <a:r>
-              <a:rPr lang="fr-FR" baseline="0" dirty="0" smtClean="0"/>
-              <a:t> quick </a:t>
-            </a:r>
-            <a:r>
-              <a:rPr lang="fr-FR" baseline="0" dirty="0" err="1" smtClean="0"/>
-              <a:t>way</a:t>
-            </a:r>
-            <a:r>
-              <a:rPr lang="fr-FR" baseline="0" dirty="0" smtClean="0"/>
-              <a:t> to </a:t>
-            </a:r>
-            <a:r>
-              <a:rPr lang="fr-FR" baseline="0" dirty="0" err="1" smtClean="0"/>
-              <a:t>parse</a:t>
-            </a:r>
-            <a:r>
-              <a:rPr lang="fr-FR" baseline="0" dirty="0" smtClean="0"/>
-              <a:t> JSON data </a:t>
-            </a:r>
-            <a:r>
-              <a:rPr lang="fr-FR" baseline="0" dirty="0" err="1" smtClean="0"/>
-              <a:t>with</a:t>
-            </a:r>
-            <a:r>
-              <a:rPr lang="fr-FR" baseline="0" dirty="0" smtClean="0"/>
-              <a:t> </a:t>
-            </a:r>
-            <a:r>
-              <a:rPr lang="fr-FR" baseline="0" dirty="0" err="1" smtClean="0"/>
-              <a:t>this</a:t>
-            </a:r>
-            <a:r>
-              <a:rPr lang="fr-FR" baseline="0" dirty="0" smtClean="0"/>
-              <a:t> </a:t>
-            </a:r>
-            <a:r>
-              <a:rPr lang="fr-FR" baseline="0" dirty="0" err="1" smtClean="0"/>
-              <a:t>library</a:t>
-            </a:r>
-            <a:endParaRPr lang="fr-FR" baseline="0" dirty="0" smtClean="0"/>
-          </a:p>
-          <a:p>
-            <a:r>
-              <a:rPr lang="fr-FR" baseline="0" dirty="0" smtClean="0"/>
-              <a:t>Note </a:t>
-            </a:r>
-            <a:r>
-              <a:rPr lang="fr-FR" baseline="0" dirty="0" err="1" smtClean="0"/>
-              <a:t>that</a:t>
-            </a:r>
-            <a:r>
-              <a:rPr lang="fr-FR" baseline="0" dirty="0" smtClean="0"/>
-              <a:t> </a:t>
-            </a:r>
-            <a:r>
-              <a:rPr lang="fr-FR" baseline="0" dirty="0" err="1" smtClean="0"/>
-              <a:t>we</a:t>
-            </a:r>
-            <a:r>
-              <a:rPr lang="fr-FR" baseline="0" dirty="0" smtClean="0"/>
-              <a:t> </a:t>
-            </a:r>
-            <a:r>
-              <a:rPr lang="fr-FR" baseline="0" dirty="0" err="1" smtClean="0"/>
-              <a:t>can</a:t>
-            </a:r>
-            <a:r>
-              <a:rPr lang="fr-FR" baseline="0" dirty="0" smtClean="0"/>
-              <a:t> use C# classes to fit </a:t>
-            </a:r>
-            <a:r>
-              <a:rPr lang="fr-FR" baseline="0" dirty="0" err="1" smtClean="0"/>
-              <a:t>with</a:t>
-            </a:r>
-            <a:r>
-              <a:rPr lang="fr-FR" baseline="0" dirty="0" smtClean="0"/>
-              <a:t> </a:t>
-            </a:r>
-            <a:r>
-              <a:rPr lang="fr-FR" baseline="0" dirty="0" err="1" smtClean="0"/>
-              <a:t>parse</a:t>
-            </a:r>
-            <a:r>
-              <a:rPr lang="fr-FR" baseline="0" dirty="0" smtClean="0"/>
-              <a:t>, use </a:t>
-            </a:r>
-            <a:r>
-              <a:rPr lang="fr-FR" baseline="0" dirty="0" err="1" smtClean="0"/>
-              <a:t>converters</a:t>
-            </a:r>
-            <a:r>
-              <a:rPr lang="fr-FR" baseline="0" dirty="0" smtClean="0"/>
-              <a:t>, </a:t>
-            </a:r>
-            <a:r>
-              <a:rPr lang="fr-FR" baseline="0" dirty="0" err="1" smtClean="0"/>
-              <a:t>dynamic</a:t>
-            </a:r>
-            <a:r>
-              <a:rPr lang="fr-FR" baseline="0" dirty="0" smtClean="0"/>
-              <a:t> and </a:t>
-            </a:r>
-            <a:r>
-              <a:rPr lang="fr-FR" baseline="0" dirty="0" err="1" smtClean="0"/>
-              <a:t>ExpandoObjects</a:t>
-            </a:r>
-            <a:r>
-              <a:rPr lang="fr-FR" baseline="0" dirty="0" smtClean="0"/>
-              <a:t>, etc… </a:t>
-            </a:r>
-            <a:r>
-              <a:rPr lang="fr-FR" baseline="0" dirty="0" err="1" smtClean="0"/>
-              <a:t>Newtonsoft.JSON</a:t>
-            </a:r>
-            <a:r>
-              <a:rPr lang="fr-FR" baseline="0" dirty="0" smtClean="0"/>
-              <a:t> </a:t>
-            </a:r>
-            <a:r>
-              <a:rPr lang="fr-FR" baseline="0" dirty="0" err="1" smtClean="0"/>
-              <a:t>is</a:t>
-            </a:r>
-            <a:r>
-              <a:rPr lang="fr-FR" baseline="0" dirty="0" smtClean="0"/>
-              <a:t> a </a:t>
-            </a:r>
-            <a:r>
-              <a:rPr lang="fr-FR" baseline="0" dirty="0" err="1" smtClean="0"/>
-              <a:t>great</a:t>
-            </a:r>
-            <a:r>
-              <a:rPr lang="fr-FR" baseline="0" dirty="0" smtClean="0"/>
-              <a:t> lib, but </a:t>
-            </a:r>
-            <a:r>
-              <a:rPr lang="fr-FR" baseline="0" dirty="0" err="1" smtClean="0"/>
-              <a:t>you</a:t>
-            </a:r>
-            <a:r>
-              <a:rPr lang="fr-FR" baseline="0" dirty="0" smtClean="0"/>
-              <a:t> </a:t>
-            </a:r>
-            <a:r>
-              <a:rPr lang="fr-FR" baseline="0" dirty="0" err="1" smtClean="0"/>
-              <a:t>don’t</a:t>
-            </a:r>
-            <a:r>
-              <a:rPr lang="fr-FR" baseline="0" dirty="0" smtClean="0"/>
-              <a:t> </a:t>
-            </a:r>
-            <a:r>
-              <a:rPr lang="fr-FR" baseline="0" dirty="0" err="1" smtClean="0"/>
-              <a:t>need</a:t>
-            </a:r>
-            <a:r>
-              <a:rPr lang="fr-FR" baseline="0" dirty="0" smtClean="0"/>
-              <a:t> to master </a:t>
-            </a:r>
-            <a:r>
-              <a:rPr lang="fr-FR" baseline="0" dirty="0" err="1" smtClean="0"/>
-              <a:t>it</a:t>
-            </a:r>
-            <a:r>
-              <a:rPr lang="fr-FR" baseline="0" dirty="0" smtClean="0"/>
-              <a:t> to use JSON data in Universal Apps</a:t>
-            </a:r>
             <a:endParaRPr lang="fr-FR" dirty="0"/>
           </a:p>
         </p:txBody>
@@ -2910,7 +2727,7 @@
             <a:fld id="{7EF0411E-54B7-49D7-BF23-01683CC1CD67}" type="datetime1">
               <a:rPr lang="en-US" smtClean="0"/>
               <a:pPr/>
-              <a:t>3/2/16</a:t>
+              <a:t>4/11/16</a:t>
             </a:fld>
             <a:endParaRPr lang="en-US"/>
           </a:p>
@@ -2957,7 +2774,7 @@
             <a:fld id="{F2894214-72F6-4306-9C26-759FB68F50CD}" type="slidenum">
               <a:rPr lang="en-US" smtClean="0"/>
               <a:pPr/>
-              <a:t>29</a:t>
+              <a:t>28</a:t>
             </a:fld>
             <a:endParaRPr lang="en-US"/>
           </a:p>
@@ -2966,7 +2783,7 @@
     </p:spTree>
     <p:extLst>
       <p:ext uri="{BB962C8B-B14F-4D97-AF65-F5344CB8AC3E}">
-        <p14:creationId xmlns:p14="http://schemas.microsoft.com/office/powerpoint/2010/main" val="2129608853"/>
+        <p14:creationId xmlns:p14="http://schemas.microsoft.com/office/powerpoint/2010/main" val="753893475"/>
       </p:ext>
     </p:extLst>
   </p:cSld>
@@ -3251,7 +3068,7 @@
             <a:fld id="{7EF0411E-54B7-49D7-BF23-01683CC1CD67}" type="datetime1">
               <a:rPr lang="en-US" smtClean="0"/>
               <a:pPr/>
-              <a:t>3/2/16</a:t>
+              <a:t>4/11/16</a:t>
             </a:fld>
             <a:endParaRPr lang="en-US"/>
           </a:p>
@@ -3298,7 +3115,7 @@
             <a:fld id="{F2894214-72F6-4306-9C26-759FB68F50CD}" type="slidenum">
               <a:rPr lang="en-US" smtClean="0"/>
               <a:pPr/>
-              <a:t>30</a:t>
+              <a:t>29</a:t>
             </a:fld>
             <a:endParaRPr lang="en-US"/>
           </a:p>
@@ -3307,7 +3124,7 @@
     </p:spTree>
     <p:extLst>
       <p:ext uri="{BB962C8B-B14F-4D97-AF65-F5344CB8AC3E}">
-        <p14:creationId xmlns:p14="http://schemas.microsoft.com/office/powerpoint/2010/main" val="769407407"/>
+        <p14:creationId xmlns:p14="http://schemas.microsoft.com/office/powerpoint/2010/main" val="2129608853"/>
       </p:ext>
     </p:extLst>
   </p:cSld>
@@ -3361,6 +3178,189 @@
           <a:bodyPr/>
           <a:lstStyle/>
           <a:p>
+            <a:r>
+              <a:rPr lang="fr-FR" dirty="0" err="1" smtClean="0"/>
+              <a:t>We’ll</a:t>
+            </a:r>
+            <a:r>
+              <a:rPr lang="fr-FR" dirty="0" smtClean="0"/>
+              <a:t> </a:t>
+            </a:r>
+            <a:r>
+              <a:rPr lang="fr-FR" dirty="0" err="1" smtClean="0"/>
+              <a:t>see</a:t>
+            </a:r>
+            <a:r>
+              <a:rPr lang="fr-FR" dirty="0" smtClean="0"/>
+              <a:t> a</a:t>
+            </a:r>
+            <a:r>
+              <a:rPr lang="fr-FR" baseline="0" dirty="0" smtClean="0"/>
+              <a:t> quick </a:t>
+            </a:r>
+            <a:r>
+              <a:rPr lang="fr-FR" baseline="0" dirty="0" err="1" smtClean="0"/>
+              <a:t>way</a:t>
+            </a:r>
+            <a:r>
+              <a:rPr lang="fr-FR" baseline="0" dirty="0" smtClean="0"/>
+              <a:t> to </a:t>
+            </a:r>
+            <a:r>
+              <a:rPr lang="fr-FR" baseline="0" dirty="0" err="1" smtClean="0"/>
+              <a:t>parse</a:t>
+            </a:r>
+            <a:r>
+              <a:rPr lang="fr-FR" baseline="0" dirty="0" smtClean="0"/>
+              <a:t> JSON data </a:t>
+            </a:r>
+            <a:r>
+              <a:rPr lang="fr-FR" baseline="0" dirty="0" err="1" smtClean="0"/>
+              <a:t>with</a:t>
+            </a:r>
+            <a:r>
+              <a:rPr lang="fr-FR" baseline="0" dirty="0" smtClean="0"/>
+              <a:t> </a:t>
+            </a:r>
+            <a:r>
+              <a:rPr lang="fr-FR" baseline="0" dirty="0" err="1" smtClean="0"/>
+              <a:t>this</a:t>
+            </a:r>
+            <a:r>
+              <a:rPr lang="fr-FR" baseline="0" dirty="0" smtClean="0"/>
+              <a:t> </a:t>
+            </a:r>
+            <a:r>
+              <a:rPr lang="fr-FR" baseline="0" dirty="0" err="1" smtClean="0"/>
+              <a:t>library</a:t>
+            </a:r>
+            <a:endParaRPr lang="fr-FR" baseline="0" dirty="0" smtClean="0"/>
+          </a:p>
+          <a:p>
+            <a:r>
+              <a:rPr lang="fr-FR" baseline="0" dirty="0" smtClean="0"/>
+              <a:t>Note </a:t>
+            </a:r>
+            <a:r>
+              <a:rPr lang="fr-FR" baseline="0" dirty="0" err="1" smtClean="0"/>
+              <a:t>that</a:t>
+            </a:r>
+            <a:r>
+              <a:rPr lang="fr-FR" baseline="0" dirty="0" smtClean="0"/>
+              <a:t> </a:t>
+            </a:r>
+            <a:r>
+              <a:rPr lang="fr-FR" baseline="0" dirty="0" err="1" smtClean="0"/>
+              <a:t>we</a:t>
+            </a:r>
+            <a:r>
+              <a:rPr lang="fr-FR" baseline="0" dirty="0" smtClean="0"/>
+              <a:t> </a:t>
+            </a:r>
+            <a:r>
+              <a:rPr lang="fr-FR" baseline="0" dirty="0" err="1" smtClean="0"/>
+              <a:t>can</a:t>
+            </a:r>
+            <a:r>
+              <a:rPr lang="fr-FR" baseline="0" dirty="0" smtClean="0"/>
+              <a:t> use C# classes to fit </a:t>
+            </a:r>
+            <a:r>
+              <a:rPr lang="fr-FR" baseline="0" dirty="0" err="1" smtClean="0"/>
+              <a:t>with</a:t>
+            </a:r>
+            <a:r>
+              <a:rPr lang="fr-FR" baseline="0" dirty="0" smtClean="0"/>
+              <a:t> </a:t>
+            </a:r>
+            <a:r>
+              <a:rPr lang="fr-FR" baseline="0" dirty="0" err="1" smtClean="0"/>
+              <a:t>parse</a:t>
+            </a:r>
+            <a:r>
+              <a:rPr lang="fr-FR" baseline="0" dirty="0" smtClean="0"/>
+              <a:t>, use </a:t>
+            </a:r>
+            <a:r>
+              <a:rPr lang="fr-FR" baseline="0" dirty="0" err="1" smtClean="0"/>
+              <a:t>converters</a:t>
+            </a:r>
+            <a:r>
+              <a:rPr lang="fr-FR" baseline="0" dirty="0" smtClean="0"/>
+              <a:t>, </a:t>
+            </a:r>
+            <a:r>
+              <a:rPr lang="fr-FR" baseline="0" dirty="0" err="1" smtClean="0"/>
+              <a:t>dynamic</a:t>
+            </a:r>
+            <a:r>
+              <a:rPr lang="fr-FR" baseline="0" dirty="0" smtClean="0"/>
+              <a:t> and </a:t>
+            </a:r>
+            <a:r>
+              <a:rPr lang="fr-FR" baseline="0" dirty="0" err="1" smtClean="0"/>
+              <a:t>ExpandoObjects</a:t>
+            </a:r>
+            <a:r>
+              <a:rPr lang="fr-FR" baseline="0" dirty="0" smtClean="0"/>
+              <a:t>, etc… </a:t>
+            </a:r>
+            <a:r>
+              <a:rPr lang="fr-FR" baseline="0" dirty="0" err="1" smtClean="0"/>
+              <a:t>Newtonsoft.JSON</a:t>
+            </a:r>
+            <a:r>
+              <a:rPr lang="fr-FR" baseline="0" dirty="0" smtClean="0"/>
+              <a:t> </a:t>
+            </a:r>
+            <a:r>
+              <a:rPr lang="fr-FR" baseline="0" dirty="0" err="1" smtClean="0"/>
+              <a:t>is</a:t>
+            </a:r>
+            <a:r>
+              <a:rPr lang="fr-FR" baseline="0" dirty="0" smtClean="0"/>
+              <a:t> a </a:t>
+            </a:r>
+            <a:r>
+              <a:rPr lang="fr-FR" baseline="0" dirty="0" err="1" smtClean="0"/>
+              <a:t>great</a:t>
+            </a:r>
+            <a:r>
+              <a:rPr lang="fr-FR" baseline="0" dirty="0" smtClean="0"/>
+              <a:t> lib, but </a:t>
+            </a:r>
+            <a:r>
+              <a:rPr lang="fr-FR" baseline="0" dirty="0" err="1" smtClean="0"/>
+              <a:t>you</a:t>
+            </a:r>
+            <a:r>
+              <a:rPr lang="fr-FR" baseline="0" dirty="0" smtClean="0"/>
+              <a:t> </a:t>
+            </a:r>
+            <a:r>
+              <a:rPr lang="fr-FR" baseline="0" dirty="0" err="1" smtClean="0"/>
+              <a:t>don’t</a:t>
+            </a:r>
+            <a:r>
+              <a:rPr lang="fr-FR" baseline="0" dirty="0" smtClean="0"/>
+              <a:t> </a:t>
+            </a:r>
+            <a:r>
+              <a:rPr lang="fr-FR" baseline="0" dirty="0" err="1" smtClean="0"/>
+              <a:t>need</a:t>
+            </a:r>
+            <a:r>
+              <a:rPr lang="fr-FR" baseline="0" dirty="0" smtClean="0"/>
+              <a:t> to master </a:t>
+            </a:r>
+            <a:r>
+              <a:rPr lang="fr-FR" baseline="0" dirty="0" err="1" smtClean="0"/>
+              <a:t>it</a:t>
+            </a:r>
+            <a:r>
+              <a:rPr lang="fr-FR" baseline="0" dirty="0" smtClean="0"/>
+              <a:t> to use JSON data in Universal Apps</a:t>
+            </a:r>
             <a:endParaRPr lang="fr-FR" dirty="0"/>
           </a:p>
         </p:txBody>
@@ -3409,7 +3409,7 @@
             <a:fld id="{7EF0411E-54B7-49D7-BF23-01683CC1CD67}" type="datetime1">
               <a:rPr lang="en-US" smtClean="0"/>
               <a:pPr/>
-              <a:t>3/2/16</a:t>
+              <a:t>4/11/16</a:t>
             </a:fld>
             <a:endParaRPr lang="en-US"/>
           </a:p>
@@ -3456,7 +3456,7 @@
             <a:fld id="{F2894214-72F6-4306-9C26-759FB68F50CD}" type="slidenum">
               <a:rPr lang="en-US" smtClean="0"/>
               <a:pPr/>
-              <a:t>31</a:t>
+              <a:t>30</a:t>
             </a:fld>
             <a:endParaRPr lang="en-US"/>
           </a:p>
@@ -3465,7 +3465,7 @@
     </p:spTree>
     <p:extLst>
       <p:ext uri="{BB962C8B-B14F-4D97-AF65-F5344CB8AC3E}">
-        <p14:creationId xmlns:p14="http://schemas.microsoft.com/office/powerpoint/2010/main" val="3830085519"/>
+        <p14:creationId xmlns:p14="http://schemas.microsoft.com/office/powerpoint/2010/main" val="769407407"/>
       </p:ext>
     </p:extLst>
   </p:cSld>
@@ -3567,7 +3567,7 @@
             <a:fld id="{7EF0411E-54B7-49D7-BF23-01683CC1CD67}" type="datetime1">
               <a:rPr lang="en-US" smtClean="0"/>
               <a:pPr/>
-              <a:t>3/2/16</a:t>
+              <a:t>4/11/16</a:t>
             </a:fld>
             <a:endParaRPr lang="en-US"/>
           </a:p>
@@ -3725,7 +3725,7 @@
             <a:fld id="{7EF0411E-54B7-49D7-BF23-01683CC1CD67}" type="datetime1">
               <a:rPr lang="en-US" smtClean="0"/>
               <a:pPr/>
-              <a:t>3/2/16</a:t>
+              <a:t>4/11/16</a:t>
             </a:fld>
             <a:endParaRPr lang="en-US"/>
           </a:p>
@@ -3772,7 +3772,7 @@
             <a:fld id="{F2894214-72F6-4306-9C26-759FB68F50CD}" type="slidenum">
               <a:rPr lang="en-US" smtClean="0"/>
               <a:pPr/>
-              <a:t>32</a:t>
+              <a:t>31</a:t>
             </a:fld>
             <a:endParaRPr lang="en-US"/>
           </a:p>
@@ -3781,7 +3781,7 @@
     </p:spTree>
     <p:extLst>
       <p:ext uri="{BB962C8B-B14F-4D97-AF65-F5344CB8AC3E}">
-        <p14:creationId xmlns:p14="http://schemas.microsoft.com/office/powerpoint/2010/main" val="2121950873"/>
+        <p14:creationId xmlns:p14="http://schemas.microsoft.com/office/powerpoint/2010/main" val="3830085519"/>
       </p:ext>
     </p:extLst>
   </p:cSld>
@@ -3835,18 +3835,10 @@
           <a:bodyPr/>
           <a:lstStyle/>
           <a:p>
-            <a:r>
-              <a:rPr lang="en-US" sz="1200" kern="1200" dirty="0" smtClean="0">
-                <a:solidFill>
-                  <a:schemeClr val="tx1"/>
-                </a:solidFill>
-                <a:latin typeface="Arial" charset="0"/>
-                <a:ea typeface="ＭＳ Ｐゴシック" charset="-128"/>
-                <a:cs typeface="ＭＳ Ｐゴシック" charset="-128"/>
-              </a:rPr>
-              <a:t>http://api.flickr.com/services/feeds/photos_public.gne?format=json&amp;nojsoncallback=1</a:t>
-            </a:r>
-            <a:endParaRPr lang="en-US" dirty="0"/>
+            <a:endParaRPr lang="fr-FR" dirty="0" smtClean="0"/>
+          </a:p>
+          <a:p>
+            <a:endParaRPr lang="fr-FR" dirty="0"/>
           </a:p>
         </p:txBody>
       </p:sp>
@@ -3894,7 +3886,7 @@
             <a:fld id="{7EF0411E-54B7-49D7-BF23-01683CC1CD67}" type="datetime1">
               <a:rPr lang="en-US" smtClean="0"/>
               <a:pPr/>
-              <a:t>3/2/16</a:t>
+              <a:t>4/11/16</a:t>
             </a:fld>
             <a:endParaRPr lang="en-US"/>
           </a:p>
@@ -3941,7 +3933,7 @@
             <a:fld id="{F2894214-72F6-4306-9C26-759FB68F50CD}" type="slidenum">
               <a:rPr lang="en-US" smtClean="0"/>
               <a:pPr/>
-              <a:t>34</a:t>
+              <a:t>32</a:t>
             </a:fld>
             <a:endParaRPr lang="en-US"/>
           </a:p>
@@ -3950,7 +3942,7 @@
     </p:spTree>
     <p:extLst>
       <p:ext uri="{BB962C8B-B14F-4D97-AF65-F5344CB8AC3E}">
-        <p14:creationId xmlns:p14="http://schemas.microsoft.com/office/powerpoint/2010/main" val="574014481"/>
+        <p14:creationId xmlns:p14="http://schemas.microsoft.com/office/powerpoint/2010/main" val="2121950873"/>
       </p:ext>
     </p:extLst>
   </p:cSld>
@@ -4004,7 +3996,18 @@
           <a:bodyPr/>
           <a:lstStyle/>
           <a:p>
-            <a:endParaRPr lang="fr-FR" dirty="0"/>
+            <a:r>
+              <a:rPr lang="en-US" sz="1200" kern="1200" dirty="0" smtClean="0">
+                <a:solidFill>
+                  <a:schemeClr val="tx1"/>
+                </a:solidFill>
+                <a:latin typeface="Arial" charset="0"/>
+                <a:ea typeface="ＭＳ Ｐゴシック" charset="-128"/>
+                <a:cs typeface="ＭＳ Ｐゴシック" charset="-128"/>
+              </a:rPr>
+              <a:t>http://api.flickr.com/services/feeds/photos_public.gne?format=json&amp;nojsoncallback=1</a:t>
+            </a:r>
+            <a:endParaRPr lang="en-US" dirty="0"/>
           </a:p>
         </p:txBody>
       </p:sp>
@@ -4052,7 +4055,7 @@
             <a:fld id="{7EF0411E-54B7-49D7-BF23-01683CC1CD67}" type="datetime1">
               <a:rPr lang="en-US" smtClean="0"/>
               <a:pPr/>
-              <a:t>3/2/16</a:t>
+              <a:t>4/11/16</a:t>
             </a:fld>
             <a:endParaRPr lang="en-US"/>
           </a:p>
@@ -4099,7 +4102,7 @@
             <a:fld id="{F2894214-72F6-4306-9C26-759FB68F50CD}" type="slidenum">
               <a:rPr lang="en-US" smtClean="0"/>
               <a:pPr/>
-              <a:t>36</a:t>
+              <a:t>34</a:t>
             </a:fld>
             <a:endParaRPr lang="en-US"/>
           </a:p>
@@ -4108,7 +4111,7 @@
     </p:spTree>
     <p:extLst>
       <p:ext uri="{BB962C8B-B14F-4D97-AF65-F5344CB8AC3E}">
-        <p14:creationId xmlns:p14="http://schemas.microsoft.com/office/powerpoint/2010/main" val="2962237406"/>
+        <p14:creationId xmlns:p14="http://schemas.microsoft.com/office/powerpoint/2010/main" val="574014481"/>
       </p:ext>
     </p:extLst>
   </p:cSld>
@@ -4210,7 +4213,7 @@
             <a:fld id="{7EF0411E-54B7-49D7-BF23-01683CC1CD67}" type="datetime1">
               <a:rPr lang="en-US" smtClean="0"/>
               <a:pPr/>
-              <a:t>3/2/16</a:t>
+              <a:t>4/11/16</a:t>
             </a:fld>
             <a:endParaRPr lang="en-US"/>
           </a:p>
@@ -4257,7 +4260,7 @@
             <a:fld id="{F2894214-72F6-4306-9C26-759FB68F50CD}" type="slidenum">
               <a:rPr lang="en-US" smtClean="0"/>
               <a:pPr/>
-              <a:t>37</a:t>
+              <a:t>36</a:t>
             </a:fld>
             <a:endParaRPr lang="en-US"/>
           </a:p>
@@ -4266,7 +4269,7 @@
     </p:spTree>
     <p:extLst>
       <p:ext uri="{BB962C8B-B14F-4D97-AF65-F5344CB8AC3E}">
-        <p14:creationId xmlns:p14="http://schemas.microsoft.com/office/powerpoint/2010/main" val="1911110508"/>
+        <p14:creationId xmlns:p14="http://schemas.microsoft.com/office/powerpoint/2010/main" val="2962237406"/>
       </p:ext>
     </p:extLst>
   </p:cSld>
@@ -4320,168 +4323,7 @@
           <a:bodyPr/>
           <a:lstStyle/>
           <a:p>
-            <a:r>
-              <a:rPr lang="fr-FR" dirty="0" smtClean="0"/>
-              <a:t>Note </a:t>
-            </a:r>
-            <a:r>
-              <a:rPr lang="fr-FR" dirty="0" err="1" smtClean="0"/>
-              <a:t>that</a:t>
-            </a:r>
-            <a:r>
-              <a:rPr lang="fr-FR" dirty="0" smtClean="0"/>
-              <a:t> </a:t>
-            </a:r>
-            <a:r>
-              <a:rPr lang="fr-FR" dirty="0" err="1" smtClean="0"/>
-              <a:t>SampleDataItem</a:t>
-            </a:r>
-            <a:r>
-              <a:rPr lang="fr-FR" dirty="0" smtClean="0"/>
-              <a:t> and </a:t>
-            </a:r>
-            <a:r>
-              <a:rPr lang="fr-FR" dirty="0" err="1" smtClean="0"/>
-              <a:t>UniqueId</a:t>
-            </a:r>
-            <a:r>
-              <a:rPr lang="fr-FR" dirty="0" smtClean="0"/>
-              <a:t> are</a:t>
-            </a:r>
-            <a:r>
-              <a:rPr lang="fr-FR" baseline="0" dirty="0" smtClean="0"/>
-              <a:t> custom classes </a:t>
-            </a:r>
-            <a:r>
-              <a:rPr lang="fr-FR" baseline="0" dirty="0" err="1" smtClean="0"/>
-              <a:t>used</a:t>
-            </a:r>
-            <a:r>
-              <a:rPr lang="fr-FR" baseline="0" dirty="0" smtClean="0"/>
-              <a:t> on </a:t>
-            </a:r>
-            <a:r>
-              <a:rPr lang="fr-FR" baseline="0" dirty="0" err="1" smtClean="0"/>
-              <a:t>HubApp</a:t>
-            </a:r>
-            <a:r>
-              <a:rPr lang="fr-FR" baseline="0" dirty="0" smtClean="0"/>
-              <a:t> </a:t>
-            </a:r>
-            <a:r>
-              <a:rPr lang="fr-FR" baseline="0" dirty="0" err="1" smtClean="0"/>
-              <a:t>example</a:t>
-            </a:r>
-            <a:r>
-              <a:rPr lang="fr-FR" baseline="0" dirty="0" smtClean="0"/>
-              <a:t> application.</a:t>
-            </a:r>
-          </a:p>
-          <a:p>
-            <a:r>
-              <a:rPr lang="fr-FR" baseline="0" dirty="0" err="1" smtClean="0"/>
-              <a:t>Tranks</a:t>
-            </a:r>
-            <a:r>
-              <a:rPr lang="fr-FR" baseline="0" dirty="0" smtClean="0"/>
-              <a:t> to bindings, </a:t>
-            </a:r>
-            <a:r>
-              <a:rPr lang="fr-FR" baseline="0" dirty="0" err="1" smtClean="0"/>
-              <a:t>we</a:t>
-            </a:r>
-            <a:r>
-              <a:rPr lang="fr-FR" baseline="0" dirty="0" smtClean="0"/>
-              <a:t> </a:t>
-            </a:r>
-            <a:r>
-              <a:rPr lang="fr-FR" baseline="0" dirty="0" err="1" smtClean="0"/>
-              <a:t>map</a:t>
-            </a:r>
-            <a:r>
-              <a:rPr lang="fr-FR" baseline="0" dirty="0" smtClean="0"/>
-              <a:t> </a:t>
-            </a:r>
-            <a:r>
-              <a:rPr lang="fr-FR" baseline="0" dirty="0" err="1" smtClean="0"/>
-              <a:t>each</a:t>
-            </a:r>
-            <a:r>
-              <a:rPr lang="fr-FR" baseline="0" dirty="0" smtClean="0"/>
-              <a:t> item to </a:t>
-            </a:r>
-            <a:r>
-              <a:rPr lang="fr-FR" baseline="0" dirty="0" err="1" smtClean="0"/>
-              <a:t>objects</a:t>
-            </a:r>
-            <a:r>
-              <a:rPr lang="fr-FR" baseline="0" dirty="0" smtClean="0"/>
-              <a:t> of type </a:t>
-            </a:r>
-            <a:r>
-              <a:rPr lang="fr-FR" baseline="0" dirty="0" err="1" smtClean="0"/>
-              <a:t>SampleDataItem</a:t>
-            </a:r>
-            <a:r>
-              <a:rPr lang="fr-FR" baseline="0" dirty="0" smtClean="0"/>
-              <a:t> and </a:t>
-            </a:r>
-            <a:r>
-              <a:rPr lang="fr-FR" baseline="0" dirty="0" err="1" smtClean="0"/>
-              <a:t>get</a:t>
-            </a:r>
-            <a:r>
-              <a:rPr lang="fr-FR" baseline="0" dirty="0" smtClean="0"/>
-              <a:t> </a:t>
-            </a:r>
-            <a:r>
-              <a:rPr lang="fr-FR" baseline="0" dirty="0" err="1" smtClean="0"/>
-              <a:t>their</a:t>
-            </a:r>
-            <a:r>
-              <a:rPr lang="fr-FR" baseline="0" dirty="0" smtClean="0"/>
-              <a:t> </a:t>
-            </a:r>
-            <a:r>
-              <a:rPr lang="fr-FR" baseline="0" dirty="0" err="1" smtClean="0"/>
-              <a:t>UniqueId</a:t>
-            </a:r>
-            <a:r>
-              <a:rPr lang="fr-FR" baseline="0" dirty="0" smtClean="0"/>
-              <a:t>, </a:t>
-            </a:r>
-            <a:r>
-              <a:rPr lang="fr-FR" baseline="0" dirty="0" err="1" smtClean="0"/>
-              <a:t>which</a:t>
-            </a:r>
-            <a:r>
-              <a:rPr lang="fr-FR" baseline="0" dirty="0" smtClean="0"/>
-              <a:t> </a:t>
-            </a:r>
-            <a:r>
-              <a:rPr lang="fr-FR" baseline="0" dirty="0" err="1" smtClean="0"/>
-              <a:t>make</a:t>
-            </a:r>
-            <a:r>
-              <a:rPr lang="fr-FR" baseline="0" dirty="0" smtClean="0"/>
-              <a:t> </a:t>
-            </a:r>
-            <a:r>
-              <a:rPr lang="fr-FR" baseline="0" dirty="0" err="1" smtClean="0"/>
-              <a:t>this</a:t>
-            </a:r>
-            <a:r>
-              <a:rPr lang="fr-FR" baseline="0" dirty="0" smtClean="0"/>
-              <a:t> code </a:t>
-            </a:r>
-            <a:r>
-              <a:rPr lang="fr-FR" baseline="0" dirty="0" err="1" smtClean="0"/>
-              <a:t>work</a:t>
-            </a:r>
-            <a:r>
-              <a:rPr lang="fr-FR" baseline="0" dirty="0" smtClean="0"/>
-              <a:t>.</a:t>
-            </a:r>
+            <a:endParaRPr lang="fr-FR" dirty="0"/>
           </a:p>
         </p:txBody>
       </p:sp>
@@ -4529,7 +4371,7 @@
             <a:fld id="{7EF0411E-54B7-49D7-BF23-01683CC1CD67}" type="datetime1">
               <a:rPr lang="en-US" smtClean="0"/>
               <a:pPr/>
-              <a:t>3/2/16</a:t>
+              <a:t>4/11/16</a:t>
             </a:fld>
             <a:endParaRPr lang="en-US"/>
           </a:p>
@@ -4576,7 +4418,7 @@
             <a:fld id="{F2894214-72F6-4306-9C26-759FB68F50CD}" type="slidenum">
               <a:rPr lang="en-US" smtClean="0"/>
               <a:pPr/>
-              <a:t>38</a:t>
+              <a:t>37</a:t>
             </a:fld>
             <a:endParaRPr lang="en-US"/>
           </a:p>
@@ -4585,7 +4427,7 @@
     </p:spTree>
     <p:extLst>
       <p:ext uri="{BB962C8B-B14F-4D97-AF65-F5344CB8AC3E}">
-        <p14:creationId xmlns:p14="http://schemas.microsoft.com/office/powerpoint/2010/main" val="2407781050"/>
+        <p14:creationId xmlns:p14="http://schemas.microsoft.com/office/powerpoint/2010/main" val="1911110508"/>
       </p:ext>
     </p:extLst>
   </p:cSld>
@@ -4639,7 +4481,168 @@
           <a:bodyPr/>
           <a:lstStyle/>
           <a:p>
-            <a:endParaRPr lang="fr-FR" dirty="0"/>
+            <a:r>
+              <a:rPr lang="fr-FR" dirty="0" smtClean="0"/>
+              <a:t>Note </a:t>
+            </a:r>
+            <a:r>
+              <a:rPr lang="fr-FR" dirty="0" err="1" smtClean="0"/>
+              <a:t>that</a:t>
+            </a:r>
+            <a:r>
+              <a:rPr lang="fr-FR" dirty="0" smtClean="0"/>
+              <a:t> </a:t>
+            </a:r>
+            <a:r>
+              <a:rPr lang="fr-FR" dirty="0" err="1" smtClean="0"/>
+              <a:t>SampleDataItem</a:t>
+            </a:r>
+            <a:r>
+              <a:rPr lang="fr-FR" dirty="0" smtClean="0"/>
+              <a:t> and </a:t>
+            </a:r>
+            <a:r>
+              <a:rPr lang="fr-FR" dirty="0" err="1" smtClean="0"/>
+              <a:t>UniqueId</a:t>
+            </a:r>
+            <a:r>
+              <a:rPr lang="fr-FR" dirty="0" smtClean="0"/>
+              <a:t> are</a:t>
+            </a:r>
+            <a:r>
+              <a:rPr lang="fr-FR" baseline="0" dirty="0" smtClean="0"/>
+              <a:t> custom classes </a:t>
+            </a:r>
+            <a:r>
+              <a:rPr lang="fr-FR" baseline="0" dirty="0" err="1" smtClean="0"/>
+              <a:t>used</a:t>
+            </a:r>
+            <a:r>
+              <a:rPr lang="fr-FR" baseline="0" dirty="0" smtClean="0"/>
+              <a:t> on </a:t>
+            </a:r>
+            <a:r>
+              <a:rPr lang="fr-FR" baseline="0" dirty="0" err="1" smtClean="0"/>
+              <a:t>HubApp</a:t>
+            </a:r>
+            <a:r>
+              <a:rPr lang="fr-FR" baseline="0" dirty="0" smtClean="0"/>
+              <a:t> </a:t>
+            </a:r>
+            <a:r>
+              <a:rPr lang="fr-FR" baseline="0" dirty="0" err="1" smtClean="0"/>
+              <a:t>example</a:t>
+            </a:r>
+            <a:r>
+              <a:rPr lang="fr-FR" baseline="0" dirty="0" smtClean="0"/>
+              <a:t> application.</a:t>
+            </a:r>
+          </a:p>
+          <a:p>
+            <a:r>
+              <a:rPr lang="fr-FR" baseline="0" dirty="0" err="1" smtClean="0"/>
+              <a:t>Tranks</a:t>
+            </a:r>
+            <a:r>
+              <a:rPr lang="fr-FR" baseline="0" dirty="0" smtClean="0"/>
+              <a:t> to bindings, </a:t>
+            </a:r>
+            <a:r>
+              <a:rPr lang="fr-FR" baseline="0" dirty="0" err="1" smtClean="0"/>
+              <a:t>we</a:t>
+            </a:r>
+            <a:r>
+              <a:rPr lang="fr-FR" baseline="0" dirty="0" smtClean="0"/>
+              <a:t> </a:t>
+            </a:r>
+            <a:r>
+              <a:rPr lang="fr-FR" baseline="0" dirty="0" err="1" smtClean="0"/>
+              <a:t>map</a:t>
+            </a:r>
+            <a:r>
+              <a:rPr lang="fr-FR" baseline="0" dirty="0" smtClean="0"/>
+              <a:t> </a:t>
+            </a:r>
+            <a:r>
+              <a:rPr lang="fr-FR" baseline="0" dirty="0" err="1" smtClean="0"/>
+              <a:t>each</a:t>
+            </a:r>
+            <a:r>
+              <a:rPr lang="fr-FR" baseline="0" dirty="0" smtClean="0"/>
+              <a:t> item to </a:t>
+            </a:r>
+            <a:r>
+              <a:rPr lang="fr-FR" baseline="0" dirty="0" err="1" smtClean="0"/>
+              <a:t>objects</a:t>
+            </a:r>
+            <a:r>
+              <a:rPr lang="fr-FR" baseline="0" dirty="0" smtClean="0"/>
+              <a:t> of type </a:t>
+            </a:r>
+            <a:r>
+              <a:rPr lang="fr-FR" baseline="0" dirty="0" err="1" smtClean="0"/>
+              <a:t>SampleDataItem</a:t>
+            </a:r>
+            <a:r>
+              <a:rPr lang="fr-FR" baseline="0" dirty="0" smtClean="0"/>
+              <a:t> and </a:t>
+            </a:r>
+            <a:r>
+              <a:rPr lang="fr-FR" baseline="0" dirty="0" err="1" smtClean="0"/>
+              <a:t>get</a:t>
+            </a:r>
+            <a:r>
+              <a:rPr lang="fr-FR" baseline="0" dirty="0" smtClean="0"/>
+              <a:t> </a:t>
+            </a:r>
+            <a:r>
+              <a:rPr lang="fr-FR" baseline="0" dirty="0" err="1" smtClean="0"/>
+              <a:t>their</a:t>
+            </a:r>
+            <a:r>
+              <a:rPr lang="fr-FR" baseline="0" dirty="0" smtClean="0"/>
+              <a:t> </a:t>
+            </a:r>
+            <a:r>
+              <a:rPr lang="fr-FR" baseline="0" dirty="0" err="1" smtClean="0"/>
+              <a:t>UniqueId</a:t>
+            </a:r>
+            <a:r>
+              <a:rPr lang="fr-FR" baseline="0" dirty="0" smtClean="0"/>
+              <a:t>, </a:t>
+            </a:r>
+            <a:r>
+              <a:rPr lang="fr-FR" baseline="0" dirty="0" err="1" smtClean="0"/>
+              <a:t>which</a:t>
+            </a:r>
+            <a:r>
+              <a:rPr lang="fr-FR" baseline="0" dirty="0" smtClean="0"/>
+              <a:t> </a:t>
+            </a:r>
+            <a:r>
+              <a:rPr lang="fr-FR" baseline="0" dirty="0" err="1" smtClean="0"/>
+              <a:t>make</a:t>
+            </a:r>
+            <a:r>
+              <a:rPr lang="fr-FR" baseline="0" dirty="0" smtClean="0"/>
+              <a:t> </a:t>
+            </a:r>
+            <a:r>
+              <a:rPr lang="fr-FR" baseline="0" dirty="0" err="1" smtClean="0"/>
+              <a:t>this</a:t>
+            </a:r>
+            <a:r>
+              <a:rPr lang="fr-FR" baseline="0" dirty="0" smtClean="0"/>
+              <a:t> code </a:t>
+            </a:r>
+            <a:r>
+              <a:rPr lang="fr-FR" baseline="0" dirty="0" err="1" smtClean="0"/>
+              <a:t>work</a:t>
+            </a:r>
+            <a:r>
+              <a:rPr lang="fr-FR" baseline="0" dirty="0" smtClean="0"/>
+              <a:t>.</a:t>
+            </a:r>
           </a:p>
         </p:txBody>
       </p:sp>
@@ -4687,7 +4690,7 @@
             <a:fld id="{7EF0411E-54B7-49D7-BF23-01683CC1CD67}" type="datetime1">
               <a:rPr lang="en-US" smtClean="0"/>
               <a:pPr/>
-              <a:t>3/2/16</a:t>
+              <a:t>4/11/16</a:t>
             </a:fld>
             <a:endParaRPr lang="en-US"/>
           </a:p>
@@ -4734,7 +4737,7 @@
             <a:fld id="{F2894214-72F6-4306-9C26-759FB68F50CD}" type="slidenum">
               <a:rPr lang="en-US" smtClean="0"/>
               <a:pPr/>
-              <a:t>39</a:t>
+              <a:t>38</a:t>
             </a:fld>
             <a:endParaRPr lang="en-US"/>
           </a:p>
@@ -4743,7 +4746,7 @@
     </p:spTree>
     <p:extLst>
       <p:ext uri="{BB962C8B-B14F-4D97-AF65-F5344CB8AC3E}">
-        <p14:creationId xmlns:p14="http://schemas.microsoft.com/office/powerpoint/2010/main" val="1372236524"/>
+        <p14:creationId xmlns:p14="http://schemas.microsoft.com/office/powerpoint/2010/main" val="2407781050"/>
       </p:ext>
     </p:extLst>
   </p:cSld>
@@ -4797,172 +4800,6 @@
           <a:bodyPr/>
           <a:lstStyle/>
           <a:p>
-            <a:r>
-              <a:rPr lang="fr-FR" dirty="0" err="1" smtClean="0"/>
-              <a:t>We</a:t>
-            </a:r>
-            <a:r>
-              <a:rPr lang="fr-FR" dirty="0" smtClean="0"/>
-              <a:t> have </a:t>
-            </a:r>
-            <a:r>
-              <a:rPr lang="fr-FR" dirty="0" err="1" smtClean="0"/>
-              <a:t>many</a:t>
-            </a:r>
-            <a:r>
-              <a:rPr lang="fr-FR" baseline="0" dirty="0" smtClean="0"/>
-              <a:t> transitions and </a:t>
-            </a:r>
-            <a:r>
-              <a:rPr lang="fr-FR" baseline="0" dirty="0" err="1" smtClean="0"/>
-              <a:t>you</a:t>
-            </a:r>
-            <a:r>
-              <a:rPr lang="fr-FR" baseline="0" dirty="0" smtClean="0"/>
-              <a:t> </a:t>
-            </a:r>
-            <a:r>
-              <a:rPr lang="fr-FR" baseline="0" dirty="0" err="1" smtClean="0"/>
-              <a:t>can</a:t>
-            </a:r>
-            <a:r>
-              <a:rPr lang="fr-FR" baseline="0" dirty="0" smtClean="0"/>
-              <a:t> </a:t>
-            </a:r>
-            <a:r>
-              <a:rPr lang="fr-FR" baseline="0" dirty="0" err="1" smtClean="0"/>
-              <a:t>even</a:t>
-            </a:r>
-            <a:r>
-              <a:rPr lang="fr-FR" baseline="0" dirty="0" smtClean="0"/>
-              <a:t> </a:t>
-            </a:r>
-            <a:r>
-              <a:rPr lang="fr-FR" baseline="0" dirty="0" err="1" smtClean="0"/>
-              <a:t>create</a:t>
-            </a:r>
-            <a:r>
-              <a:rPr lang="fr-FR" baseline="0" dirty="0" smtClean="0"/>
-              <a:t> </a:t>
-            </a:r>
-            <a:r>
-              <a:rPr lang="fr-FR" baseline="0" dirty="0" err="1" smtClean="0"/>
-              <a:t>your</a:t>
-            </a:r>
-            <a:r>
-              <a:rPr lang="fr-FR" baseline="0" dirty="0" smtClean="0"/>
-              <a:t> </a:t>
-            </a:r>
-            <a:r>
-              <a:rPr lang="fr-FR" baseline="0" dirty="0" err="1" smtClean="0"/>
-              <a:t>own</a:t>
-            </a:r>
-            <a:r>
-              <a:rPr lang="fr-FR" baseline="0" dirty="0" smtClean="0"/>
-              <a:t> </a:t>
-            </a:r>
-            <a:r>
-              <a:rPr lang="fr-FR" baseline="0" dirty="0" err="1" smtClean="0"/>
-              <a:t>with</a:t>
-            </a:r>
-            <a:r>
-              <a:rPr lang="fr-FR" baseline="0" dirty="0" smtClean="0"/>
-              <a:t> </a:t>
-            </a:r>
-            <a:r>
-              <a:rPr lang="fr-FR" baseline="0" dirty="0" err="1" smtClean="0"/>
-              <a:t>storyboards</a:t>
-            </a:r>
-            <a:r>
-              <a:rPr lang="fr-FR" baseline="0" dirty="0" smtClean="0"/>
-              <a:t>.</a:t>
-            </a:r>
-          </a:p>
-          <a:p>
-            <a:r>
-              <a:rPr lang="fr-FR" baseline="0" dirty="0" smtClean="0"/>
-              <a:t>It sure </a:t>
-            </a:r>
-            <a:r>
-              <a:rPr lang="fr-FR" baseline="0" dirty="0" err="1" smtClean="0"/>
-              <a:t>is</a:t>
-            </a:r>
-            <a:r>
-              <a:rPr lang="fr-FR" baseline="0" dirty="0" smtClean="0"/>
-              <a:t> </a:t>
-            </a:r>
-            <a:r>
-              <a:rPr lang="fr-FR" baseline="0" dirty="0" err="1" smtClean="0"/>
-              <a:t>interesting</a:t>
-            </a:r>
-            <a:r>
-              <a:rPr lang="fr-FR" baseline="0" dirty="0" smtClean="0"/>
-              <a:t> but default transitions </a:t>
-            </a:r>
-            <a:r>
-              <a:rPr lang="fr-FR" baseline="0" dirty="0" err="1" smtClean="0"/>
-              <a:t>keeps</a:t>
-            </a:r>
-            <a:r>
-              <a:rPr lang="fr-FR" baseline="0" dirty="0" smtClean="0"/>
-              <a:t> the user in a </a:t>
-            </a:r>
-            <a:r>
-              <a:rPr lang="fr-FR" baseline="0" dirty="0" err="1" smtClean="0"/>
-              <a:t>known</a:t>
-            </a:r>
-            <a:r>
-              <a:rPr lang="fr-FR" baseline="0" dirty="0" smtClean="0"/>
-              <a:t> </a:t>
-            </a:r>
-            <a:r>
-              <a:rPr lang="fr-FR" baseline="0" dirty="0" err="1" smtClean="0"/>
-              <a:t>environment</a:t>
-            </a:r>
-            <a:r>
-              <a:rPr lang="fr-FR" baseline="0" dirty="0" smtClean="0"/>
-              <a:t>. For the </a:t>
-            </a:r>
-            <a:r>
-              <a:rPr lang="fr-FR" baseline="0" dirty="0" err="1" smtClean="0"/>
-              <a:t>sake</a:t>
-            </a:r>
-            <a:r>
-              <a:rPr lang="fr-FR" baseline="0" dirty="0" smtClean="0"/>
-              <a:t> of UX, </a:t>
-            </a:r>
-            <a:r>
-              <a:rPr lang="fr-FR" baseline="0" dirty="0" err="1" smtClean="0"/>
-              <a:t>be</a:t>
-            </a:r>
-            <a:r>
-              <a:rPr lang="fr-FR" baseline="0" dirty="0" smtClean="0"/>
-              <a:t> </a:t>
-            </a:r>
-            <a:r>
-              <a:rPr lang="fr-FR" baseline="0" dirty="0" err="1" smtClean="0"/>
-              <a:t>careful</a:t>
-            </a:r>
-            <a:r>
-              <a:rPr lang="fr-FR" baseline="0" dirty="0" smtClean="0"/>
-              <a:t> </a:t>
-            </a:r>
-            <a:r>
-              <a:rPr lang="fr-FR" baseline="0" dirty="0" err="1" smtClean="0"/>
-              <a:t>with</a:t>
-            </a:r>
-            <a:r>
-              <a:rPr lang="fr-FR" baseline="0" dirty="0" smtClean="0"/>
-              <a:t> </a:t>
-            </a:r>
-            <a:r>
-              <a:rPr lang="fr-FR" baseline="0" dirty="0" err="1" smtClean="0"/>
-              <a:t>awkwards</a:t>
-            </a:r>
-            <a:r>
-              <a:rPr lang="fr-FR" baseline="0" dirty="0" smtClean="0"/>
-              <a:t> transitions.</a:t>
-            </a:r>
             <a:endParaRPr lang="fr-FR" dirty="0"/>
           </a:p>
         </p:txBody>
@@ -5011,7 +4848,331 @@
             <a:fld id="{7EF0411E-54B7-49D7-BF23-01683CC1CD67}" type="datetime1">
               <a:rPr lang="en-US" smtClean="0"/>
               <a:pPr/>
-              <a:t>3/2/16</a:t>
+              <a:t>4/11/16</a:t>
+            </a:fld>
+            <a:endParaRPr lang="en-US"/>
+          </a:p>
+        </p:txBody>
+      </p:sp>
+      <p:sp>
+        <p:nvSpPr>
+          <p:cNvPr id="6" name="Espace réservé du pied de page 5"/>
+          <p:cNvSpPr>
+            <a:spLocks noGrp="1"/>
+          </p:cNvSpPr>
+          <p:nvPr>
+            <p:ph type="ftr" sz="quarter" idx="12"/>
+          </p:nvPr>
+        </p:nvSpPr>
+        <p:spPr/>
+        <p:txBody>
+          <a:bodyPr/>
+          <a:lstStyle/>
+          <a:p>
+            <a:r>
+              <a:rPr lang="en-US" smtClean="0"/>
+              <a:t>Copyright © 2004-2005 NameOfTheOrganization. All rights reserved.</a:t>
+            </a:r>
+            <a:endParaRPr lang="en-US"/>
+          </a:p>
+        </p:txBody>
+      </p:sp>
+      <p:sp>
+        <p:nvSpPr>
+          <p:cNvPr id="7" name="Espace réservé du numéro de diapositive 6"/>
+          <p:cNvSpPr>
+            <a:spLocks noGrp="1"/>
+          </p:cNvSpPr>
+          <p:nvPr>
+            <p:ph type="sldNum" sz="quarter" idx="13"/>
+          </p:nvPr>
+        </p:nvSpPr>
+        <p:spPr/>
+        <p:txBody>
+          <a:bodyPr/>
+          <a:lstStyle/>
+          <a:p>
+            <a:fld id="{F2894214-72F6-4306-9C26-759FB68F50CD}" type="slidenum">
+              <a:rPr lang="en-US" smtClean="0"/>
+              <a:pPr/>
+              <a:t>39</a:t>
+            </a:fld>
+            <a:endParaRPr lang="en-US"/>
+          </a:p>
+        </p:txBody>
+      </p:sp>
+    </p:spTree>
+    <p:extLst>
+      <p:ext uri="{BB962C8B-B14F-4D97-AF65-F5344CB8AC3E}">
+        <p14:creationId xmlns:p14="http://schemas.microsoft.com/office/powerpoint/2010/main" val="1372236524"/>
+      </p:ext>
+    </p:extLst>
+  </p:cSld>
+  <p:clrMapOvr>
+    <a:masterClrMapping/>
+  </p:clrMapOvr>
+</p:notes>
+</file>
+
+<file path=ppt/notesSlides/notesSlide27.xml><?xml version="1.0" encoding="utf-8"?>
+<p:notes xmlns:a="http://schemas.openxmlformats.org/drawingml/2006/main" xmlns:r="http://schemas.openxmlformats.org/officeDocument/2006/relationships" xmlns:p="http://schemas.openxmlformats.org/presentationml/2006/main">
+  <p:cSld>
+    <p:spTree>
+      <p:nvGrpSpPr>
+        <p:cNvPr id="1" name=""/>
+        <p:cNvGrpSpPr/>
+        <p:nvPr/>
+      </p:nvGrpSpPr>
+      <p:grpSpPr>
+        <a:xfrm>
+          <a:off x="0" y="0"/>
+          <a:ext cx="0" cy="0"/>
+          <a:chOff x="0" y="0"/>
+          <a:chExt cx="0" cy="0"/>
+        </a:xfrm>
+      </p:grpSpPr>
+      <p:sp>
+        <p:nvSpPr>
+          <p:cNvPr id="2" name="Espace réservé de l'image des diapositives 1"/>
+          <p:cNvSpPr>
+            <a:spLocks noGrp="1" noRot="1" noChangeAspect="1"/>
+          </p:cNvSpPr>
+          <p:nvPr>
+            <p:ph type="sldImg"/>
+          </p:nvPr>
+        </p:nvSpPr>
+        <p:spPr/>
+      </p:sp>
+      <p:sp>
+        <p:nvSpPr>
+          <p:cNvPr id="3" name="Espace réservé des commentaires 2"/>
+          <p:cNvSpPr>
+            <a:spLocks noGrp="1"/>
+          </p:cNvSpPr>
+          <p:nvPr>
+            <p:ph type="body" idx="1"/>
+          </p:nvPr>
+        </p:nvSpPr>
+        <p:spPr/>
+        <p:txBody>
+          <a:bodyPr/>
+          <a:lstStyle/>
+          <a:p>
+            <a:r>
+              <a:rPr lang="fr-FR" dirty="0" err="1" smtClean="0"/>
+              <a:t>We</a:t>
+            </a:r>
+            <a:r>
+              <a:rPr lang="fr-FR" dirty="0" smtClean="0"/>
+              <a:t> have </a:t>
+            </a:r>
+            <a:r>
+              <a:rPr lang="fr-FR" dirty="0" err="1" smtClean="0"/>
+              <a:t>many</a:t>
+            </a:r>
+            <a:r>
+              <a:rPr lang="fr-FR" baseline="0" dirty="0" smtClean="0"/>
+              <a:t> transitions and </a:t>
+            </a:r>
+            <a:r>
+              <a:rPr lang="fr-FR" baseline="0" dirty="0" err="1" smtClean="0"/>
+              <a:t>you</a:t>
+            </a:r>
+            <a:r>
+              <a:rPr lang="fr-FR" baseline="0" dirty="0" smtClean="0"/>
+              <a:t> </a:t>
+            </a:r>
+            <a:r>
+              <a:rPr lang="fr-FR" baseline="0" dirty="0" err="1" smtClean="0"/>
+              <a:t>can</a:t>
+            </a:r>
+            <a:r>
+              <a:rPr lang="fr-FR" baseline="0" dirty="0" smtClean="0"/>
+              <a:t> </a:t>
+            </a:r>
+            <a:r>
+              <a:rPr lang="fr-FR" baseline="0" dirty="0" err="1" smtClean="0"/>
+              <a:t>even</a:t>
+            </a:r>
+            <a:r>
+              <a:rPr lang="fr-FR" baseline="0" dirty="0" smtClean="0"/>
+              <a:t> </a:t>
+            </a:r>
+            <a:r>
+              <a:rPr lang="fr-FR" baseline="0" dirty="0" err="1" smtClean="0"/>
+              <a:t>create</a:t>
+            </a:r>
+            <a:r>
+              <a:rPr lang="fr-FR" baseline="0" dirty="0" smtClean="0"/>
+              <a:t> </a:t>
+            </a:r>
+            <a:r>
+              <a:rPr lang="fr-FR" baseline="0" dirty="0" err="1" smtClean="0"/>
+              <a:t>your</a:t>
+            </a:r>
+            <a:r>
+              <a:rPr lang="fr-FR" baseline="0" dirty="0" smtClean="0"/>
+              <a:t> </a:t>
+            </a:r>
+            <a:r>
+              <a:rPr lang="fr-FR" baseline="0" dirty="0" err="1" smtClean="0"/>
+              <a:t>own</a:t>
+            </a:r>
+            <a:r>
+              <a:rPr lang="fr-FR" baseline="0" dirty="0" smtClean="0"/>
+              <a:t> </a:t>
+            </a:r>
+            <a:r>
+              <a:rPr lang="fr-FR" baseline="0" dirty="0" err="1" smtClean="0"/>
+              <a:t>with</a:t>
+            </a:r>
+            <a:r>
+              <a:rPr lang="fr-FR" baseline="0" dirty="0" smtClean="0"/>
+              <a:t> </a:t>
+            </a:r>
+            <a:r>
+              <a:rPr lang="fr-FR" baseline="0" dirty="0" err="1" smtClean="0"/>
+              <a:t>storyboards</a:t>
+            </a:r>
+            <a:r>
+              <a:rPr lang="fr-FR" baseline="0" dirty="0" smtClean="0"/>
+              <a:t>.</a:t>
+            </a:r>
+          </a:p>
+          <a:p>
+            <a:r>
+              <a:rPr lang="fr-FR" baseline="0" dirty="0" smtClean="0"/>
+              <a:t>It sure </a:t>
+            </a:r>
+            <a:r>
+              <a:rPr lang="fr-FR" baseline="0" dirty="0" err="1" smtClean="0"/>
+              <a:t>is</a:t>
+            </a:r>
+            <a:r>
+              <a:rPr lang="fr-FR" baseline="0" dirty="0" smtClean="0"/>
+              <a:t> </a:t>
+            </a:r>
+            <a:r>
+              <a:rPr lang="fr-FR" baseline="0" dirty="0" err="1" smtClean="0"/>
+              <a:t>interesting</a:t>
+            </a:r>
+            <a:r>
+              <a:rPr lang="fr-FR" baseline="0" dirty="0" smtClean="0"/>
+              <a:t> but default transitions </a:t>
+            </a:r>
+            <a:r>
+              <a:rPr lang="fr-FR" baseline="0" dirty="0" err="1" smtClean="0"/>
+              <a:t>keeps</a:t>
+            </a:r>
+            <a:r>
+              <a:rPr lang="fr-FR" baseline="0" dirty="0" smtClean="0"/>
+              <a:t> the user in a </a:t>
+            </a:r>
+            <a:r>
+              <a:rPr lang="fr-FR" baseline="0" dirty="0" err="1" smtClean="0"/>
+              <a:t>known</a:t>
+            </a:r>
+            <a:r>
+              <a:rPr lang="fr-FR" baseline="0" dirty="0" smtClean="0"/>
+              <a:t> </a:t>
+            </a:r>
+            <a:r>
+              <a:rPr lang="fr-FR" baseline="0" dirty="0" err="1" smtClean="0"/>
+              <a:t>environment</a:t>
+            </a:r>
+            <a:r>
+              <a:rPr lang="fr-FR" baseline="0" dirty="0" smtClean="0"/>
+              <a:t>. For the </a:t>
+            </a:r>
+            <a:r>
+              <a:rPr lang="fr-FR" baseline="0" dirty="0" err="1" smtClean="0"/>
+              <a:t>sake</a:t>
+            </a:r>
+            <a:r>
+              <a:rPr lang="fr-FR" baseline="0" dirty="0" smtClean="0"/>
+              <a:t> of UX, </a:t>
+            </a:r>
+            <a:r>
+              <a:rPr lang="fr-FR" baseline="0" dirty="0" err="1" smtClean="0"/>
+              <a:t>be</a:t>
+            </a:r>
+            <a:r>
+              <a:rPr lang="fr-FR" baseline="0" dirty="0" smtClean="0"/>
+              <a:t> </a:t>
+            </a:r>
+            <a:r>
+              <a:rPr lang="fr-FR" baseline="0" dirty="0" err="1" smtClean="0"/>
+              <a:t>careful</a:t>
+            </a:r>
+            <a:r>
+              <a:rPr lang="fr-FR" baseline="0" dirty="0" smtClean="0"/>
+              <a:t> </a:t>
+            </a:r>
+            <a:r>
+              <a:rPr lang="fr-FR" baseline="0" dirty="0" err="1" smtClean="0"/>
+              <a:t>with</a:t>
+            </a:r>
+            <a:r>
+              <a:rPr lang="fr-FR" baseline="0" dirty="0" smtClean="0"/>
+              <a:t> </a:t>
+            </a:r>
+            <a:r>
+              <a:rPr lang="fr-FR" baseline="0" dirty="0" err="1" smtClean="0"/>
+              <a:t>awkwards</a:t>
+            </a:r>
+            <a:r>
+              <a:rPr lang="fr-FR" baseline="0" dirty="0" smtClean="0"/>
+              <a:t> transitions.</a:t>
+            </a:r>
+            <a:endParaRPr lang="fr-FR" dirty="0"/>
+          </a:p>
+        </p:txBody>
+      </p:sp>
+      <p:sp>
+        <p:nvSpPr>
+          <p:cNvPr id="4" name="Espace réservé de l'en-tête 3"/>
+          <p:cNvSpPr>
+            <a:spLocks noGrp="1"/>
+          </p:cNvSpPr>
+          <p:nvPr>
+            <p:ph type="hdr" sz="quarter" idx="10"/>
+          </p:nvPr>
+        </p:nvSpPr>
+        <p:spPr/>
+        <p:txBody>
+          <a:bodyPr/>
+          <a:lstStyle/>
+          <a:p>
+            <a:pPr>
+              <a:defRPr/>
+            </a:pPr>
+            <a:r>
+              <a:rPr lang="en-US" smtClean="0"/>
+              <a:t>[Title of the course]</a:t>
+            </a:r>
+            <a:endParaRPr lang="en-US"/>
+          </a:p>
+        </p:txBody>
+      </p:sp>
+      <p:sp>
+        <p:nvSpPr>
+          <p:cNvPr id="5" name="Espace réservé de la date 4"/>
+          <p:cNvSpPr>
+            <a:spLocks noGrp="1"/>
+          </p:cNvSpPr>
+          <p:nvPr>
+            <p:ph type="dt" idx="11"/>
+          </p:nvPr>
+        </p:nvSpPr>
+        <p:spPr/>
+        <p:txBody>
+          <a:bodyPr/>
+          <a:lstStyle/>
+          <a:p>
+            <a:fld id="{7EF0411E-54B7-49D7-BF23-01683CC1CD67}" type="datetime1">
+              <a:rPr lang="en-US" smtClean="0"/>
+              <a:pPr/>
+              <a:t>4/11/16</a:t>
             </a:fld>
             <a:endParaRPr lang="en-US"/>
           </a:p>
@@ -5169,7 +5330,7 @@
             <a:fld id="{7EF0411E-54B7-49D7-BF23-01683CC1CD67}" type="datetime1">
               <a:rPr lang="en-US" smtClean="0"/>
               <a:pPr/>
-              <a:t>3/2/16</a:t>
+              <a:t>4/11/16</a:t>
             </a:fld>
             <a:endParaRPr lang="en-US"/>
           </a:p>
@@ -5411,7 +5572,7 @@
             <a:fld id="{7EF0411E-54B7-49D7-BF23-01683CC1CD67}" type="datetime1">
               <a:rPr lang="en-US" smtClean="0"/>
               <a:pPr/>
-              <a:t>3/2/16</a:t>
+              <a:t>4/11/16</a:t>
             </a:fld>
             <a:endParaRPr lang="en-US"/>
           </a:p>
@@ -5569,7 +5730,7 @@
             <a:fld id="{7EF0411E-54B7-49D7-BF23-01683CC1CD67}" type="datetime1">
               <a:rPr lang="en-US" smtClean="0"/>
               <a:pPr/>
-              <a:t>3/2/16</a:t>
+              <a:t>4/11/16</a:t>
             </a:fld>
             <a:endParaRPr lang="en-US"/>
           </a:p>
@@ -5727,7 +5888,7 @@
             <a:fld id="{7EF0411E-54B7-49D7-BF23-01683CC1CD67}" type="datetime1">
               <a:rPr lang="en-US" smtClean="0"/>
               <a:pPr/>
-              <a:t>3/2/16</a:t>
+              <a:t>4/11/16</a:t>
             </a:fld>
             <a:endParaRPr lang="en-US"/>
           </a:p>
@@ -5885,7 +6046,7 @@
             <a:fld id="{7EF0411E-54B7-49D7-BF23-01683CC1CD67}" type="datetime1">
               <a:rPr lang="en-US" smtClean="0"/>
               <a:pPr/>
-              <a:t>3/2/16</a:t>
+              <a:t>4/11/16</a:t>
             </a:fld>
             <a:endParaRPr lang="en-US"/>
           </a:p>
@@ -6043,7 +6204,7 @@
             <a:fld id="{7EF0411E-54B7-49D7-BF23-01683CC1CD67}" type="datetime1">
               <a:rPr lang="en-US" smtClean="0"/>
               <a:pPr/>
-              <a:t>3/2/16</a:t>
+              <a:t>4/11/16</a:t>
             </a:fld>
             <a:endParaRPr lang="en-US"/>
           </a:p>
@@ -6201,7 +6362,7 @@
             <a:fld id="{7EF0411E-54B7-49D7-BF23-01683CC1CD67}" type="datetime1">
               <a:rPr lang="en-US" smtClean="0"/>
               <a:pPr/>
-              <a:t>3/2/16</a:t>
+              <a:t>4/11/16</a:t>
             </a:fld>
             <a:endParaRPr lang="en-US"/>
           </a:p>
@@ -6465,7 +6626,7 @@
             <a:fld id="{FB40B297-F50D-484C-ACFB-7B14BBEC6D9D}" type="datetimeFigureOut">
               <a:rPr lang="fr-FR"/>
               <a:pPr/>
-              <a:t>02/03/2016</a:t>
+              <a:t>11/04/2016</a:t>
             </a:fld>
             <a:endParaRPr lang="fr-FR"/>
           </a:p>
@@ -6688,7 +6849,7 @@
             <a:fld id="{1152C86D-858F-4436-887E-FAA64C472B10}" type="datetimeFigureOut">
               <a:rPr lang="fr-FR"/>
               <a:pPr/>
-              <a:t>02/03/2016</a:t>
+              <a:t>11/04/2016</a:t>
             </a:fld>
             <a:endParaRPr lang="fr-FR"/>
           </a:p>
@@ -6921,7 +7082,7 @@
             <a:fld id="{01631552-3809-4475-B076-571F79DD8438}" type="datetimeFigureOut">
               <a:rPr lang="fr-FR"/>
               <a:pPr/>
-              <a:t>02/03/2016</a:t>
+              <a:t>11/04/2016</a:t>
             </a:fld>
             <a:endParaRPr lang="fr-FR"/>
           </a:p>
@@ -7182,7 +7343,7 @@
             <a:fld id="{58F3536A-E70C-492D-8B6C-9516539BB90B}" type="datetimeFigureOut">
               <a:rPr lang="fr-FR"/>
               <a:pPr/>
-              <a:t>02/03/2016</a:t>
+              <a:t>11/04/2016</a:t>
             </a:fld>
             <a:endParaRPr lang="fr-FR"/>
           </a:p>
@@ -7481,7 +7642,7 @@
             <a:fld id="{A1F0D905-E438-41C5-8546-C118A5946D7D}" type="datetimeFigureOut">
               <a:rPr lang="fr-FR"/>
               <a:pPr/>
-              <a:t>02/03/2016</a:t>
+              <a:t>11/04/2016</a:t>
             </a:fld>
             <a:endParaRPr lang="fr-FR"/>
           </a:p>
@@ -7860,7 +8021,7 @@
             <a:fld id="{456FFFF1-2C65-4327-9840-2B43B23FD6B1}" type="datetimeFigureOut">
               <a:rPr lang="fr-FR"/>
               <a:pPr/>
-              <a:t>02/03/2016</a:t>
+              <a:t>11/04/2016</a:t>
             </a:fld>
             <a:endParaRPr lang="fr-FR"/>
           </a:p>
@@ -8373,7 +8534,7 @@
             <a:fld id="{8F6554C8-55AE-4EFB-BB46-A79A617C7A68}" type="datetimeFigureOut">
               <a:rPr lang="fr-FR"/>
               <a:pPr/>
-              <a:t>02/03/2016</a:t>
+              <a:t>11/04/2016</a:t>
             </a:fld>
             <a:endParaRPr lang="fr-FR"/>
           </a:p>
@@ -8582,7 +8743,7 @@
             <a:fld id="{58A0FB1A-DC0F-4BA7-8E04-D8DDB0C51F6A}" type="datetimeFigureOut">
               <a:rPr lang="fr-FR"/>
               <a:pPr/>
-              <a:t>02/03/2016</a:t>
+              <a:t>11/04/2016</a:t>
             </a:fld>
             <a:endParaRPr lang="fr-FR"/>
           </a:p>
@@ -8730,7 +8891,7 @@
             <a:fld id="{7B55CAE2-4705-4758-B174-288BF2998352}" type="datetimeFigureOut">
               <a:rPr lang="fr-FR"/>
               <a:pPr/>
-              <a:t>02/03/2016</a:t>
+              <a:t>11/04/2016</a:t>
             </a:fld>
             <a:endParaRPr lang="fr-FR"/>
           </a:p>
@@ -9060,7 +9221,7 @@
             <a:fld id="{A7A2DD87-EF16-4542-8E2C-04CB6C2EC50F}" type="datetimeFigureOut">
               <a:rPr lang="fr-FR"/>
               <a:pPr/>
-              <a:t>02/03/2016</a:t>
+              <a:t>11/04/2016</a:t>
             </a:fld>
             <a:endParaRPr lang="fr-FR"/>
           </a:p>
@@ -9373,7 +9534,7 @@
             <a:fld id="{977BE084-309E-469E-847E-32D69B823DBE}" type="datetimeFigureOut">
               <a:rPr lang="fr-FR"/>
               <a:pPr/>
-              <a:t>02/03/2016</a:t>
+              <a:t>11/04/2016</a:t>
             </a:fld>
             <a:endParaRPr lang="fr-FR"/>
           </a:p>
@@ -17150,7 +17311,7 @@
           <p:nvPr/>
         </p:nvPicPr>
         <p:blipFill>
-          <a:blip r:embed="rId2">
+          <a:blip r:embed="rId3">
             <a:extLst>
               <a:ext uri="{28A0092B-C50C-407E-A947-70E740481C1C}">
                 <a14:useLocalDpi xmlns:a14="http://schemas.microsoft.com/office/drawing/2010/main" val="0"/>
@@ -17321,7 +17482,7 @@
         </p:blipFill>
         <p:spPr>
           <a:xfrm>
-            <a:off x="4416733" y="3073524"/>
+            <a:off x="4416733" y="3001516"/>
             <a:ext cx="4572000" cy="2095917"/>
           </a:xfrm>
           <a:prstGeom prst="rect">
@@ -17454,15 +17615,7 @@
                   <a:srgbClr val="D9DEE3"/>
                 </a:solidFill>
               </a:rPr>
-              <a:t>BINDING </a:t>
-            </a:r>
-            <a:r>
-              <a:rPr lang="fr-FR" sz="5400" dirty="0" smtClean="0">
-                <a:solidFill>
-                  <a:srgbClr val="D9DEE3"/>
-                </a:solidFill>
-              </a:rPr>
-              <a:t>PROJECT</a:t>
+              <a:t>BINDING PROJECT</a:t>
             </a:r>
           </a:p>
         </p:txBody>
@@ -22307,6 +22460,182 @@
           </a:p>
         </p:txBody>
       </p:sp>
+      <p:cxnSp>
+        <p:nvCxnSpPr>
+          <p:cNvPr id="3" name="Connecteur droit 2"/>
+          <p:cNvCxnSpPr/>
+          <p:nvPr/>
+        </p:nvCxnSpPr>
+        <p:spPr>
+          <a:xfrm flipV="1">
+            <a:off x="179512" y="841375"/>
+            <a:ext cx="8964488" cy="3600301"/>
+          </a:xfrm>
+          <a:prstGeom prst="line">
+            <a:avLst/>
+          </a:prstGeom>
+        </p:spPr>
+        <p:style>
+          <a:lnRef idx="2">
+            <a:schemeClr val="accent1"/>
+          </a:lnRef>
+          <a:fillRef idx="0">
+            <a:schemeClr val="accent1"/>
+          </a:fillRef>
+          <a:effectRef idx="1">
+            <a:schemeClr val="accent1"/>
+          </a:effectRef>
+          <a:fontRef idx="minor">
+            <a:schemeClr val="tx1"/>
+          </a:fontRef>
+        </p:style>
+      </p:cxnSp>
+      <p:sp>
+        <p:nvSpPr>
+          <p:cNvPr id="4" name="Rectangle à coins arrondis 3"/>
+          <p:cNvSpPr/>
+          <p:nvPr/>
+        </p:nvSpPr>
+        <p:spPr>
+          <a:xfrm>
+            <a:off x="3275856" y="2426221"/>
+            <a:ext cx="5472608" cy="2520280"/>
+          </a:xfrm>
+          <a:prstGeom prst="roundRect">
+            <a:avLst/>
+          </a:prstGeom>
+        </p:spPr>
+        <p:style>
+          <a:lnRef idx="1">
+            <a:schemeClr val="accent1"/>
+          </a:lnRef>
+          <a:fillRef idx="3">
+            <a:schemeClr val="accent1"/>
+          </a:fillRef>
+          <a:effectRef idx="2">
+            <a:schemeClr val="accent1"/>
+          </a:effectRef>
+          <a:fontRef idx="minor">
+            <a:schemeClr val="lt1"/>
+          </a:fontRef>
+        </p:style>
+        <p:txBody>
+          <a:bodyPr rtlCol="0" anchor="ctr"/>
+          <a:lstStyle/>
+          <a:p>
+            <a:r>
+              <a:rPr lang="fr-FR" dirty="0"/>
+              <a:t>Best </a:t>
+            </a:r>
+            <a:r>
+              <a:rPr lang="fr-FR" dirty="0" err="1"/>
+              <a:t>method</a:t>
+            </a:r>
+            <a:r>
+              <a:rPr lang="fr-FR" dirty="0"/>
+              <a:t> -&gt; </a:t>
+            </a:r>
+            <a:endParaRPr lang="fr-FR" dirty="0" smtClean="0"/>
+          </a:p>
+          <a:p>
+            <a:pPr marL="342900" indent="-342900">
+              <a:buAutoNum type="arabicParenR"/>
+            </a:pPr>
+            <a:r>
+              <a:rPr lang="fr-FR" dirty="0" err="1" smtClean="0"/>
+              <a:t>Generate</a:t>
+            </a:r>
+            <a:r>
+              <a:rPr lang="fr-FR" dirty="0" smtClean="0"/>
+              <a:t> set of C# classes </a:t>
+            </a:r>
+            <a:r>
+              <a:rPr lang="fr-FR" dirty="0" err="1" smtClean="0"/>
+              <a:t>which</a:t>
+            </a:r>
+            <a:r>
+              <a:rPr lang="fr-FR" dirty="0" smtClean="0"/>
+              <a:t> </a:t>
+            </a:r>
+            <a:r>
+              <a:rPr lang="fr-FR" dirty="0" err="1" smtClean="0"/>
+              <a:t>represent</a:t>
+            </a:r>
+            <a:r>
+              <a:rPr lang="fr-FR" dirty="0" smtClean="0"/>
+              <a:t> JSON </a:t>
+            </a:r>
+            <a:r>
+              <a:rPr lang="fr-FR" dirty="0" err="1" smtClean="0"/>
+              <a:t>object</a:t>
+            </a:r>
+            <a:r>
+              <a:rPr lang="fr-FR" dirty="0" smtClean="0"/>
+              <a:t> </a:t>
+            </a:r>
+            <a:r>
+              <a:rPr lang="fr-FR" dirty="0" err="1" smtClean="0"/>
+              <a:t>response</a:t>
+            </a:r>
+            <a:r>
+              <a:rPr lang="fr-FR" dirty="0" smtClean="0"/>
+              <a:t> (http</a:t>
+            </a:r>
+            <a:r>
+              <a:rPr lang="fr-FR" dirty="0"/>
+              <a:t>://json2csharp.com</a:t>
+            </a:r>
+            <a:r>
+              <a:rPr lang="fr-FR" dirty="0" smtClean="0"/>
+              <a:t>/#) </a:t>
+            </a:r>
+          </a:p>
+          <a:p>
+            <a:pPr marL="342900" indent="-342900">
+              <a:buAutoNum type="arabicParenR"/>
+            </a:pPr>
+            <a:r>
+              <a:rPr lang="fr-FR" dirty="0" smtClean="0"/>
+              <a:t>Use : </a:t>
+            </a:r>
+            <a:r>
+              <a:rPr lang="fr-FR" dirty="0" err="1" smtClean="0"/>
+              <a:t>JsonConvert.DeserializedObject</a:t>
+            </a:r>
+            <a:r>
+              <a:rPr lang="fr-FR" dirty="0" smtClean="0"/>
+              <a:t>&lt;</a:t>
+            </a:r>
+            <a:r>
+              <a:rPr lang="fr-FR" dirty="0" err="1" smtClean="0"/>
+              <a:t>RootObject</a:t>
+            </a:r>
+            <a:r>
+              <a:rPr lang="fr-FR" dirty="0" smtClean="0"/>
+              <a:t>&gt;</a:t>
+            </a:r>
+          </a:p>
+          <a:p>
+            <a:r>
+              <a:rPr lang="fr-FR" dirty="0" smtClean="0"/>
+              <a:t>(</a:t>
+            </a:r>
+            <a:r>
+              <a:rPr lang="fr-FR" dirty="0" err="1" smtClean="0"/>
+              <a:t>json</a:t>
+            </a:r>
+            <a:r>
+              <a:rPr lang="fr-FR" dirty="0" smtClean="0"/>
+              <a:t>);</a:t>
+            </a:r>
+            <a:endParaRPr lang="fr-FR" dirty="0"/>
+          </a:p>
+          <a:p>
+            <a:pPr algn="ctr"/>
+            <a:endParaRPr lang="en-GB" dirty="0"/>
+          </a:p>
+        </p:txBody>
+      </p:sp>
     </p:spTree>
     <p:extLst>
       <p:ext uri="{BB962C8B-B14F-4D97-AF65-F5344CB8AC3E}">
@@ -25346,21 +25675,18 @@
           <a:lstStyle/>
           <a:p>
             <a:r>
+              <a:rPr lang="en-US" sz="1600" b="1" smtClean="0">
+                <a:latin typeface="Courier New" panose="02070309020205020404" pitchFamily="49" charset="0"/>
+                <a:cs typeface="Courier New" panose="02070309020205020404" pitchFamily="49" charset="0"/>
+              </a:rPr>
+              <a:t>override </a:t>
+            </a:r>
+            <a:r>
               <a:rPr lang="en-US" sz="1600" b="1" dirty="0" smtClean="0">
-                <a:solidFill>
-                  <a:srgbClr val="0070C0"/>
-                </a:solidFill>
-                <a:latin typeface="Courier New" panose="02070309020205020404" pitchFamily="49" charset="0"/>
-                <a:cs typeface="Courier New" panose="02070309020205020404" pitchFamily="49" charset="0"/>
-              </a:rPr>
-              <a:t>void</a:t>
-            </a:r>
-            <a:r>
-              <a:rPr lang="en-US" sz="1600" b="1" dirty="0" smtClean="0">
-                <a:latin typeface="Courier New" panose="02070309020205020404" pitchFamily="49" charset="0"/>
-                <a:cs typeface="Courier New" panose="02070309020205020404" pitchFamily="49" charset="0"/>
-              </a:rPr>
-              <a:t> override void </a:t>
+                <a:latin typeface="Courier New" panose="02070309020205020404" pitchFamily="49" charset="0"/>
+                <a:cs typeface="Courier New" panose="02070309020205020404" pitchFamily="49" charset="0"/>
+              </a:rPr>
+              <a:t>void </a:t>
             </a:r>
             <a:r>
               <a:rPr lang="en-US" sz="1600" b="1" dirty="0" err="1" smtClean="0">

</xml_diff>